<commit_message>
parsing docx and pptx
</commit_message>
<xml_diff>
--- a/Шары.pptx
+++ b/Шары.pptx
@@ -11,7 +11,14 @@
     <p:sldId id="259" r:id="rId5"/>
     <p:sldId id="261" r:id="rId6"/>
     <p:sldId id="262" r:id="rId7"/>
-    <p:sldId id="260" r:id="rId8"/>
+    <p:sldId id="263" r:id="rId8"/>
+    <p:sldId id="264" r:id="rId9"/>
+    <p:sldId id="265" r:id="rId10"/>
+    <p:sldId id="267" r:id="rId11"/>
+    <p:sldId id="266" r:id="rId12"/>
+    <p:sldId id="269" r:id="rId13"/>
+    <p:sldId id="268" r:id="rId14"/>
+    <p:sldId id="260" r:id="rId15"/>
   </p:sldIdLst>
   <p:sldSz cx="12192000" cy="6858000"/>
   <p:notesSz cx="6858000" cy="9144000"/>
@@ -110,6 +117,11 @@
       </a:defRPr>
     </a:lvl9pPr>
   </p:defaultTextStyle>
+  <p:extLst>
+    <p:ext uri="{EFAFB233-063F-42B5-8137-9DF3F51BA10A}">
+      <p15:sldGuideLst xmlns:p15="http://schemas.microsoft.com/office/powerpoint/2012/main"/>
+    </p:ext>
+  </p:extLst>
 </p:presentation>
 </file>
 
@@ -123,6 +135,14 @@
     </p:extLst>
   </p:cmAuthor>
 </p:cmAuthorLst>
+</file>
+
+<file path=ppt/revisionInfo.xml><?xml version="1.0" encoding="utf-8"?>
+<p1510:revInfo xmlns:a="http://schemas.openxmlformats.org/drawingml/2006/main" xmlns:r="http://schemas.openxmlformats.org/officeDocument/2006/relationships" xmlns:p1510="http://schemas.microsoft.com/office/powerpoint/2015/10/main">
+  <p1510:revLst>
+    <p1510:client id="{F44AD304-58BF-44DB-809C-1995F7DEFCD7}" v="306" dt="2023-12-19T13:14:30.661"/>
+  </p1510:revLst>
+</p1510:revInfo>
 </file>
 
 <file path=ppt/diagrams/colors1.xml><?xml version="1.0" encoding="utf-8"?>
@@ -6101,7 +6121,7 @@
           <a:p>
             <a:fld id="{9A6C8AB4-2EE2-4E77-811F-333C10AFE02A}" type="datetimeFigureOut">
               <a:rPr lang="ru-RU" smtClean="0"/>
-              <a:t>18.12.2023</a:t>
+              <a:t>19.12.2023</a:t>
             </a:fld>
             <a:endParaRPr lang="ru-RU"/>
           </a:p>
@@ -6537,7 +6557,7 @@
           <a:p>
             <a:fld id="{9A6C8AB4-2EE2-4E77-811F-333C10AFE02A}" type="datetimeFigureOut">
               <a:rPr lang="ru-RU" smtClean="0"/>
-              <a:t>18.12.2023</a:t>
+              <a:t>19.12.2023</a:t>
             </a:fld>
             <a:endParaRPr lang="ru-RU"/>
           </a:p>
@@ -6787,7 +6807,7 @@
           <a:p>
             <a:fld id="{9A6C8AB4-2EE2-4E77-811F-333C10AFE02A}" type="datetimeFigureOut">
               <a:rPr lang="ru-RU" smtClean="0"/>
-              <a:t>18.12.2023</a:t>
+              <a:t>19.12.2023</a:t>
             </a:fld>
             <a:endParaRPr lang="ru-RU"/>
           </a:p>
@@ -7095,7 +7115,7 @@
           <a:p>
             <a:fld id="{9A6C8AB4-2EE2-4E77-811F-333C10AFE02A}" type="datetimeFigureOut">
               <a:rPr lang="ru-RU" smtClean="0"/>
-              <a:t>18.12.2023</a:t>
+              <a:t>19.12.2023</a:t>
             </a:fld>
             <a:endParaRPr lang="ru-RU"/>
           </a:p>
@@ -7413,7 +7433,7 @@
           <a:p>
             <a:fld id="{9A6C8AB4-2EE2-4E77-811F-333C10AFE02A}" type="datetimeFigureOut">
               <a:rPr lang="ru-RU" smtClean="0"/>
-              <a:t>18.12.2023</a:t>
+              <a:t>19.12.2023</a:t>
             </a:fld>
             <a:endParaRPr lang="ru-RU"/>
           </a:p>
@@ -7715,7 +7735,7 @@
           <a:p>
             <a:fld id="{9A6C8AB4-2EE2-4E77-811F-333C10AFE02A}" type="datetimeFigureOut">
               <a:rPr lang="ru-RU" smtClean="0"/>
-              <a:t>18.12.2023</a:t>
+              <a:t>19.12.2023</a:t>
             </a:fld>
             <a:endParaRPr lang="ru-RU"/>
           </a:p>
@@ -8082,7 +8102,7 @@
           <a:p>
             <a:fld id="{9A6C8AB4-2EE2-4E77-811F-333C10AFE02A}" type="datetimeFigureOut">
               <a:rPr lang="ru-RU" smtClean="0"/>
-              <a:t>18.12.2023</a:t>
+              <a:t>19.12.2023</a:t>
             </a:fld>
             <a:endParaRPr lang="ru-RU"/>
           </a:p>
@@ -8256,7 +8276,7 @@
           <a:p>
             <a:fld id="{9A6C8AB4-2EE2-4E77-811F-333C10AFE02A}" type="datetimeFigureOut">
               <a:rPr lang="ru-RU" smtClean="0"/>
-              <a:t>18.12.2023</a:t>
+              <a:t>19.12.2023</a:t>
             </a:fld>
             <a:endParaRPr lang="ru-RU"/>
           </a:p>
@@ -8436,7 +8456,7 @@
           <a:p>
             <a:fld id="{9A6C8AB4-2EE2-4E77-811F-333C10AFE02A}" type="datetimeFigureOut">
               <a:rPr lang="ru-RU" smtClean="0"/>
-              <a:t>18.12.2023</a:t>
+              <a:t>19.12.2023</a:t>
             </a:fld>
             <a:endParaRPr lang="ru-RU"/>
           </a:p>
@@ -8606,7 +8626,7 @@
           <a:p>
             <a:fld id="{9A6C8AB4-2EE2-4E77-811F-333C10AFE02A}" type="datetimeFigureOut">
               <a:rPr lang="ru-RU" smtClean="0"/>
-              <a:t>18.12.2023</a:t>
+              <a:t>19.12.2023</a:t>
             </a:fld>
             <a:endParaRPr lang="ru-RU"/>
           </a:p>
@@ -8856,7 +8876,7 @@
           <a:p>
             <a:fld id="{9A6C8AB4-2EE2-4E77-811F-333C10AFE02A}" type="datetimeFigureOut">
               <a:rPr lang="ru-RU" smtClean="0"/>
-              <a:t>18.12.2023</a:t>
+              <a:t>19.12.2023</a:t>
             </a:fld>
             <a:endParaRPr lang="ru-RU"/>
           </a:p>
@@ -9092,7 +9112,7 @@
           <a:p>
             <a:fld id="{9A6C8AB4-2EE2-4E77-811F-333C10AFE02A}" type="datetimeFigureOut">
               <a:rPr lang="ru-RU" smtClean="0"/>
-              <a:t>18.12.2023</a:t>
+              <a:t>19.12.2023</a:t>
             </a:fld>
             <a:endParaRPr lang="ru-RU"/>
           </a:p>
@@ -9474,7 +9494,7 @@
           <a:p>
             <a:fld id="{9A6C8AB4-2EE2-4E77-811F-333C10AFE02A}" type="datetimeFigureOut">
               <a:rPr lang="ru-RU" smtClean="0"/>
-              <a:t>18.12.2023</a:t>
+              <a:t>19.12.2023</a:t>
             </a:fld>
             <a:endParaRPr lang="ru-RU"/>
           </a:p>
@@ -9592,7 +9612,7 @@
           <a:p>
             <a:fld id="{9A6C8AB4-2EE2-4E77-811F-333C10AFE02A}" type="datetimeFigureOut">
               <a:rPr lang="ru-RU" smtClean="0"/>
-              <a:t>18.12.2023</a:t>
+              <a:t>19.12.2023</a:t>
             </a:fld>
             <a:endParaRPr lang="ru-RU"/>
           </a:p>
@@ -9687,7 +9707,7 @@
           <a:p>
             <a:fld id="{9A6C8AB4-2EE2-4E77-811F-333C10AFE02A}" type="datetimeFigureOut">
               <a:rPr lang="ru-RU" smtClean="0"/>
-              <a:t>18.12.2023</a:t>
+              <a:t>19.12.2023</a:t>
             </a:fld>
             <a:endParaRPr lang="ru-RU"/>
           </a:p>
@@ -9942,7 +9962,7 @@
           <a:p>
             <a:fld id="{9A6C8AB4-2EE2-4E77-811F-333C10AFE02A}" type="datetimeFigureOut">
               <a:rPr lang="ru-RU" smtClean="0"/>
-              <a:t>18.12.2023</a:t>
+              <a:t>19.12.2023</a:t>
             </a:fld>
             <a:endParaRPr lang="ru-RU"/>
           </a:p>
@@ -10225,7 +10245,7 @@
           <a:p>
             <a:fld id="{9A6C8AB4-2EE2-4E77-811F-333C10AFE02A}" type="datetimeFigureOut">
               <a:rPr lang="ru-RU" smtClean="0"/>
-              <a:t>18.12.2023</a:t>
+              <a:t>19.12.2023</a:t>
             </a:fld>
             <a:endParaRPr lang="ru-RU"/>
           </a:p>
@@ -10631,7 +10651,7 @@
           <a:p>
             <a:fld id="{9A6C8AB4-2EE2-4E77-811F-333C10AFE02A}" type="datetimeFigureOut">
               <a:rPr lang="ru-RU" smtClean="0"/>
-              <a:t>18.12.2023</a:t>
+              <a:t>19.12.2023</a:t>
             </a:fld>
             <a:endParaRPr lang="ru-RU"/>
           </a:p>
@@ -11991,6 +12011,1523 @@
 </p:sld>
 </file>
 
+<file path=ppt/slides/slide10.xml><?xml version="1.0" encoding="utf-8"?>
+<p:sld xmlns:a="http://schemas.openxmlformats.org/drawingml/2006/main" xmlns:r="http://schemas.openxmlformats.org/officeDocument/2006/relationships" xmlns:p="http://schemas.openxmlformats.org/presentationml/2006/main">
+  <p:cSld>
+    <p:bg>
+      <p:bgPr>
+        <a:gradFill rotWithShape="1">
+          <a:gsLst>
+            <a:gs pos="10000">
+              <a:schemeClr val="bg2">
+                <a:tint val="97000"/>
+                <a:hueMod val="92000"/>
+                <a:satMod val="169000"/>
+                <a:lumMod val="164000"/>
+              </a:schemeClr>
+            </a:gs>
+            <a:gs pos="100000">
+              <a:schemeClr val="bg2">
+                <a:shade val="96000"/>
+                <a:satMod val="120000"/>
+                <a:lumMod val="90000"/>
+              </a:schemeClr>
+            </a:gs>
+          </a:gsLst>
+          <a:lin ang="6120000" scaled="1"/>
+        </a:gradFill>
+        <a:effectLst/>
+      </p:bgPr>
+    </p:bg>
+    <p:spTree>
+      <p:nvGrpSpPr>
+        <p:cNvPr id="1" name="">
+          <a:extLst>
+            <a:ext uri="{FF2B5EF4-FFF2-40B4-BE49-F238E27FC236}">
+              <a16:creationId xmlns:a16="http://schemas.microsoft.com/office/drawing/2014/main" id="{DD37C756-3E18-78A6-D553-DC0FB13BD7E9}"/>
+            </a:ext>
+          </a:extLst>
+        </p:cNvPr>
+        <p:cNvGrpSpPr/>
+        <p:nvPr/>
+      </p:nvGrpSpPr>
+      <p:grpSpPr>
+        <a:xfrm>
+          <a:off x="0" y="0"/>
+          <a:ext cx="0" cy="0"/>
+          <a:chOff x="0" y="0"/>
+          <a:chExt cx="0" cy="0"/>
+        </a:xfrm>
+      </p:grpSpPr>
+      <p:grpSp>
+        <p:nvGrpSpPr>
+          <p:cNvPr id="5" name="Group 7">
+            <a:extLst>
+              <a:ext uri="{FF2B5EF4-FFF2-40B4-BE49-F238E27FC236}">
+                <a16:creationId xmlns:a16="http://schemas.microsoft.com/office/drawing/2014/main" id="{BF6F3917-FAEF-4F5C-BE12-CF65574CE44B}"/>
+              </a:ext>
+              <a:ext uri="{C183D7F6-B498-43B3-948B-1728B52AA6E4}">
+                <adec:decorative xmlns:adec="http://schemas.microsoft.com/office/drawing/2017/decorative" val="1"/>
+              </a:ext>
+            </a:extLst>
+          </p:cNvPr>
+          <p:cNvGrpSpPr>
+            <a:grpSpLocks noGrp="1" noUngrp="1" noRot="1" noChangeAspect="1" noMove="1" noResize="1"/>
+          </p:cNvGrpSpPr>
+          <p:nvPr>
+            <p:extLst>
+              <p:ext uri="{386F3935-93C4-4BCD-93E2-E3B085C9AB24}">
+                <p16:designElem xmlns:p16="http://schemas.microsoft.com/office/powerpoint/2015/main" val="1"/>
+              </p:ext>
+            </p:extLst>
+          </p:nvPr>
+        </p:nvGrpSpPr>
+        <p:grpSpPr>
+          <a:xfrm>
+            <a:off x="9206969" y="2963333"/>
+            <a:ext cx="2981858" cy="3208867"/>
+            <a:chOff x="9206969" y="2963333"/>
+            <a:chExt cx="2981858" cy="3208867"/>
+          </a:xfrm>
+        </p:grpSpPr>
+        <p:cxnSp>
+          <p:nvCxnSpPr>
+            <p:cNvPr id="9" name="Straight Connector 8">
+              <a:extLst>
+                <a:ext uri="{FF2B5EF4-FFF2-40B4-BE49-F238E27FC236}">
+                  <a16:creationId xmlns:a16="http://schemas.microsoft.com/office/drawing/2014/main" id="{9EFF6467-061A-4EB4-A666-8ED016C0C0EC}"/>
+                </a:ext>
+                <a:ext uri="{C183D7F6-B498-43B3-948B-1728B52AA6E4}">
+                  <adec:decorative xmlns:adec="http://schemas.microsoft.com/office/drawing/2017/decorative" val="1"/>
+                </a:ext>
+              </a:extLst>
+            </p:cNvPr>
+            <p:cNvCxnSpPr/>
+            <p:nvPr>
+              <p:extLst>
+                <p:ext uri="{386F3935-93C4-4BCD-93E2-E3B085C9AB24}">
+                  <p16:designElem xmlns:p16="http://schemas.microsoft.com/office/powerpoint/2015/main" val="1"/>
+                </p:ext>
+              </p:extLst>
+            </p:nvPr>
+          </p:nvCxnSpPr>
+          <p:spPr>
+            <a:xfrm flipH="1">
+              <a:off x="11276012" y="2963333"/>
+              <a:ext cx="912814" cy="912812"/>
+            </a:xfrm>
+            <a:prstGeom prst="line">
+              <a:avLst/>
+            </a:prstGeom>
+            <a:ln w="9525">
+              <a:solidFill>
+                <a:schemeClr val="tx1"/>
+              </a:solidFill>
+            </a:ln>
+          </p:spPr>
+          <p:style>
+            <a:lnRef idx="2">
+              <a:schemeClr val="accent1"/>
+            </a:lnRef>
+            <a:fillRef idx="0">
+              <a:schemeClr val="accent1"/>
+            </a:fillRef>
+            <a:effectRef idx="1">
+              <a:schemeClr val="accent1"/>
+            </a:effectRef>
+            <a:fontRef idx="minor">
+              <a:schemeClr val="tx1"/>
+            </a:fontRef>
+          </p:style>
+        </p:cxnSp>
+        <p:cxnSp>
+          <p:nvCxnSpPr>
+            <p:cNvPr id="10" name="Straight Connector 9">
+              <a:extLst>
+                <a:ext uri="{FF2B5EF4-FFF2-40B4-BE49-F238E27FC236}">
+                  <a16:creationId xmlns:a16="http://schemas.microsoft.com/office/drawing/2014/main" id="{EDA5CB9C-6466-4DB3-83C9-AE3B536A5452}"/>
+                </a:ext>
+                <a:ext uri="{C183D7F6-B498-43B3-948B-1728B52AA6E4}">
+                  <adec:decorative xmlns:adec="http://schemas.microsoft.com/office/drawing/2017/decorative" val="1"/>
+                </a:ext>
+              </a:extLst>
+            </p:cNvPr>
+            <p:cNvCxnSpPr/>
+            <p:nvPr>
+              <p:extLst>
+                <p:ext uri="{386F3935-93C4-4BCD-93E2-E3B085C9AB24}">
+                  <p16:designElem xmlns:p16="http://schemas.microsoft.com/office/powerpoint/2015/main" val="1"/>
+                </p:ext>
+              </p:extLst>
+            </p:nvPr>
+          </p:nvCxnSpPr>
+          <p:spPr>
+            <a:xfrm flipH="1">
+              <a:off x="9206969" y="3190344"/>
+              <a:ext cx="2981857" cy="2981856"/>
+            </a:xfrm>
+            <a:prstGeom prst="line">
+              <a:avLst/>
+            </a:prstGeom>
+            <a:ln w="9525">
+              <a:solidFill>
+                <a:schemeClr val="tx1"/>
+              </a:solidFill>
+            </a:ln>
+          </p:spPr>
+          <p:style>
+            <a:lnRef idx="2">
+              <a:schemeClr val="accent1"/>
+            </a:lnRef>
+            <a:fillRef idx="0">
+              <a:schemeClr val="accent1"/>
+            </a:fillRef>
+            <a:effectRef idx="1">
+              <a:schemeClr val="accent1"/>
+            </a:effectRef>
+            <a:fontRef idx="minor">
+              <a:schemeClr val="tx1"/>
+            </a:fontRef>
+          </p:style>
+        </p:cxnSp>
+        <p:cxnSp>
+          <p:nvCxnSpPr>
+            <p:cNvPr id="11" name="Straight Connector 10">
+              <a:extLst>
+                <a:ext uri="{FF2B5EF4-FFF2-40B4-BE49-F238E27FC236}">
+                  <a16:creationId xmlns:a16="http://schemas.microsoft.com/office/drawing/2014/main" id="{4AA604B4-1AE4-48CB-981A-54CC4AE3C041}"/>
+                </a:ext>
+                <a:ext uri="{C183D7F6-B498-43B3-948B-1728B52AA6E4}">
+                  <adec:decorative xmlns:adec="http://schemas.microsoft.com/office/drawing/2017/decorative" val="1"/>
+                </a:ext>
+              </a:extLst>
+            </p:cNvPr>
+            <p:cNvCxnSpPr/>
+            <p:nvPr>
+              <p:extLst>
+                <p:ext uri="{386F3935-93C4-4BCD-93E2-E3B085C9AB24}">
+                  <p16:designElem xmlns:p16="http://schemas.microsoft.com/office/powerpoint/2015/main" val="1"/>
+                </p:ext>
+              </p:extLst>
+            </p:nvPr>
+          </p:nvCxnSpPr>
+          <p:spPr>
+            <a:xfrm flipH="1">
+              <a:off x="10292292" y="3285067"/>
+              <a:ext cx="1896534" cy="1896533"/>
+            </a:xfrm>
+            <a:prstGeom prst="line">
+              <a:avLst/>
+            </a:prstGeom>
+            <a:ln w="9525">
+              <a:solidFill>
+                <a:schemeClr val="tx1"/>
+              </a:solidFill>
+            </a:ln>
+          </p:spPr>
+          <p:style>
+            <a:lnRef idx="2">
+              <a:schemeClr val="accent1"/>
+            </a:lnRef>
+            <a:fillRef idx="0">
+              <a:schemeClr val="accent1"/>
+            </a:fillRef>
+            <a:effectRef idx="1">
+              <a:schemeClr val="accent1"/>
+            </a:effectRef>
+            <a:fontRef idx="minor">
+              <a:schemeClr val="tx1"/>
+            </a:fontRef>
+          </p:style>
+        </p:cxnSp>
+        <p:cxnSp>
+          <p:nvCxnSpPr>
+            <p:cNvPr id="12" name="Straight Connector 11">
+              <a:extLst>
+                <a:ext uri="{FF2B5EF4-FFF2-40B4-BE49-F238E27FC236}">
+                  <a16:creationId xmlns:a16="http://schemas.microsoft.com/office/drawing/2014/main" id="{65D1C11E-228A-44D3-B3E8-1364E7393DE4}"/>
+                </a:ext>
+                <a:ext uri="{C183D7F6-B498-43B3-948B-1728B52AA6E4}">
+                  <adec:decorative xmlns:adec="http://schemas.microsoft.com/office/drawing/2017/decorative" val="1"/>
+                </a:ext>
+              </a:extLst>
+            </p:cNvPr>
+            <p:cNvCxnSpPr/>
+            <p:nvPr>
+              <p:extLst>
+                <p:ext uri="{386F3935-93C4-4BCD-93E2-E3B085C9AB24}">
+                  <p16:designElem xmlns:p16="http://schemas.microsoft.com/office/powerpoint/2015/main" val="1"/>
+                </p:ext>
+              </p:extLst>
+            </p:nvPr>
+          </p:nvCxnSpPr>
+          <p:spPr>
+            <a:xfrm flipH="1">
+              <a:off x="10443103" y="3131080"/>
+              <a:ext cx="1745722" cy="1745720"/>
+            </a:xfrm>
+            <a:prstGeom prst="line">
+              <a:avLst/>
+            </a:prstGeom>
+            <a:ln w="28575">
+              <a:solidFill>
+                <a:schemeClr val="tx1"/>
+              </a:solidFill>
+            </a:ln>
+          </p:spPr>
+          <p:style>
+            <a:lnRef idx="2">
+              <a:schemeClr val="accent1"/>
+            </a:lnRef>
+            <a:fillRef idx="0">
+              <a:schemeClr val="accent1"/>
+            </a:fillRef>
+            <a:effectRef idx="1">
+              <a:schemeClr val="accent1"/>
+            </a:effectRef>
+            <a:fontRef idx="minor">
+              <a:schemeClr val="tx1"/>
+            </a:fontRef>
+          </p:style>
+        </p:cxnSp>
+        <p:cxnSp>
+          <p:nvCxnSpPr>
+            <p:cNvPr id="13" name="Straight Connector 12">
+              <a:extLst>
+                <a:ext uri="{FF2B5EF4-FFF2-40B4-BE49-F238E27FC236}">
+                  <a16:creationId xmlns:a16="http://schemas.microsoft.com/office/drawing/2014/main" id="{F0FD3847-BF68-4ACE-83F8-1E7CC32B17CC}"/>
+                </a:ext>
+                <a:ext uri="{C183D7F6-B498-43B3-948B-1728B52AA6E4}">
+                  <adec:decorative xmlns:adec="http://schemas.microsoft.com/office/drawing/2017/decorative" val="1"/>
+                </a:ext>
+              </a:extLst>
+            </p:cNvPr>
+            <p:cNvCxnSpPr/>
+            <p:nvPr>
+              <p:extLst>
+                <p:ext uri="{386F3935-93C4-4BCD-93E2-E3B085C9AB24}">
+                  <p16:designElem xmlns:p16="http://schemas.microsoft.com/office/powerpoint/2015/main" val="1"/>
+                </p:ext>
+              </p:extLst>
+            </p:nvPr>
+          </p:nvCxnSpPr>
+          <p:spPr>
+            <a:xfrm flipH="1">
+              <a:off x="10918826" y="3683001"/>
+              <a:ext cx="1270001" cy="1269999"/>
+            </a:xfrm>
+            <a:prstGeom prst="line">
+              <a:avLst/>
+            </a:prstGeom>
+            <a:ln w="28575">
+              <a:solidFill>
+                <a:schemeClr val="tx1"/>
+              </a:solidFill>
+            </a:ln>
+          </p:spPr>
+          <p:style>
+            <a:lnRef idx="2">
+              <a:schemeClr val="accent1"/>
+            </a:lnRef>
+            <a:fillRef idx="0">
+              <a:schemeClr val="accent1"/>
+            </a:fillRef>
+            <a:effectRef idx="1">
+              <a:schemeClr val="accent1"/>
+            </a:effectRef>
+            <a:fontRef idx="minor">
+              <a:schemeClr val="tx1"/>
+            </a:fontRef>
+          </p:style>
+        </p:cxnSp>
+      </p:grpSp>
+      <p:sp useBgFill="1">
+        <p:nvSpPr>
+          <p:cNvPr id="15" name="Rectangle 14">
+            <a:extLst>
+              <a:ext uri="{FF2B5EF4-FFF2-40B4-BE49-F238E27FC236}">
+                <a16:creationId xmlns:a16="http://schemas.microsoft.com/office/drawing/2014/main" id="{547BBBDC-7066-4AF7-9C62-1803AB2F9BA7}"/>
+              </a:ext>
+              <a:ext uri="{C183D7F6-B498-43B3-948B-1728B52AA6E4}">
+                <adec:decorative xmlns:adec="http://schemas.microsoft.com/office/drawing/2017/decorative" val="1"/>
+              </a:ext>
+            </a:extLst>
+          </p:cNvPr>
+          <p:cNvSpPr>
+            <a:spLocks noGrp="1" noRot="1" noChangeAspect="1" noMove="1" noResize="1" noEditPoints="1" noAdjustHandles="1" noChangeArrowheads="1" noChangeShapeType="1" noTextEdit="1"/>
+          </p:cNvSpPr>
+          <p:nvPr>
+            <p:extLst>
+              <p:ext uri="{386F3935-93C4-4BCD-93E2-E3B085C9AB24}">
+                <p16:designElem xmlns:p16="http://schemas.microsoft.com/office/powerpoint/2015/main" val="1"/>
+              </p:ext>
+            </p:extLst>
+          </p:nvPr>
+        </p:nvSpPr>
+        <p:spPr>
+          <a:xfrm>
+            <a:off x="0" y="0"/>
+            <a:ext cx="12192000" cy="6858000"/>
+          </a:xfrm>
+          <a:prstGeom prst="rect">
+            <a:avLst/>
+          </a:prstGeom>
+          <a:ln>
+            <a:noFill/>
+          </a:ln>
+        </p:spPr>
+        <p:style>
+          <a:lnRef idx="2">
+            <a:schemeClr val="accent1">
+              <a:shade val="50000"/>
+            </a:schemeClr>
+          </a:lnRef>
+          <a:fillRef idx="1">
+            <a:schemeClr val="accent1"/>
+          </a:fillRef>
+          <a:effectRef idx="0">
+            <a:schemeClr val="accent1"/>
+          </a:effectRef>
+          <a:fontRef idx="minor">
+            <a:schemeClr val="lt1"/>
+          </a:fontRef>
+        </p:style>
+        <p:txBody>
+          <a:bodyPr rtlCol="0" anchor="ctr"/>
+          <a:lstStyle/>
+          <a:p>
+            <a:pPr algn="ctr"/>
+            <a:endParaRPr lang="en-US"/>
+          </a:p>
+        </p:txBody>
+      </p:sp>
+      <p:sp>
+        <p:nvSpPr>
+          <p:cNvPr id="17" name="Snip Diagonal Corner Rectangle 24">
+            <a:extLst>
+              <a:ext uri="{FF2B5EF4-FFF2-40B4-BE49-F238E27FC236}">
+                <a16:creationId xmlns:a16="http://schemas.microsoft.com/office/drawing/2014/main" id="{350FA329-CBE0-46FE-A19B-84D688DAD7BD}"/>
+              </a:ext>
+              <a:ext uri="{C183D7F6-B498-43B3-948B-1728B52AA6E4}">
+                <adec:decorative xmlns:adec="http://schemas.microsoft.com/office/drawing/2017/decorative" val="1"/>
+              </a:ext>
+            </a:extLst>
+          </p:cNvPr>
+          <p:cNvSpPr>
+            <a:spLocks noGrp="1" noRot="1" noChangeAspect="1" noMove="1" noResize="1" noEditPoints="1" noAdjustHandles="1" noChangeArrowheads="1" noChangeShapeType="1" noTextEdit="1"/>
+          </p:cNvSpPr>
+          <p:nvPr>
+            <p:extLst>
+              <p:ext uri="{386F3935-93C4-4BCD-93E2-E3B085C9AB24}">
+                <p16:designElem xmlns:p16="http://schemas.microsoft.com/office/powerpoint/2015/main" val="1"/>
+              </p:ext>
+            </p:extLst>
+          </p:nvPr>
+        </p:nvSpPr>
+        <p:spPr>
+          <a:xfrm>
+            <a:off x="628229" y="620722"/>
+            <a:ext cx="10935543" cy="5286838"/>
+          </a:xfrm>
+          <a:prstGeom prst="snip2DiagRect">
+            <a:avLst>
+              <a:gd name="adj1" fmla="val 10787"/>
+              <a:gd name="adj2" fmla="val 0"/>
+            </a:avLst>
+          </a:prstGeom>
+          <a:solidFill>
+            <a:srgbClr val="FFFFFF"/>
+          </a:solidFill>
+          <a:ln>
+            <a:noFill/>
+          </a:ln>
+          <a:effectLst>
+            <a:innerShdw blurRad="57150" dist="38100" dir="14460000">
+              <a:prstClr val="black">
+                <a:alpha val="70000"/>
+              </a:prstClr>
+            </a:innerShdw>
+          </a:effectLst>
+        </p:spPr>
+        <p:style>
+          <a:lnRef idx="2">
+            <a:schemeClr val="accent1">
+              <a:shade val="50000"/>
+            </a:schemeClr>
+          </a:lnRef>
+          <a:fillRef idx="1">
+            <a:schemeClr val="accent1"/>
+          </a:fillRef>
+          <a:effectRef idx="0">
+            <a:schemeClr val="accent1"/>
+          </a:effectRef>
+          <a:fontRef idx="minor">
+            <a:schemeClr val="lt1"/>
+          </a:fontRef>
+        </p:style>
+        <p:txBody>
+          <a:bodyPr rtlCol="0" anchor="ctr"/>
+          <a:lstStyle/>
+          <a:p>
+            <a:pPr algn="ctr"/>
+            <a:endParaRPr lang="en-US"/>
+          </a:p>
+        </p:txBody>
+      </p:sp>
+      <p:pic>
+        <p:nvPicPr>
+          <p:cNvPr id="2" name="Рисунок 1" descr="Habr — сообщество IT-специалистов on Windows PC Download Free - 7.0.0 -  ru.habrahabr">
+            <a:extLst>
+              <a:ext uri="{FF2B5EF4-FFF2-40B4-BE49-F238E27FC236}">
+                <a16:creationId xmlns:a16="http://schemas.microsoft.com/office/drawing/2014/main" id="{48D2F145-B6C0-B1CF-0309-D72A789BAC83}"/>
+              </a:ext>
+            </a:extLst>
+          </p:cNvPr>
+          <p:cNvPicPr>
+            <a:picLocks noChangeAspect="1"/>
+          </p:cNvPicPr>
+          <p:nvPr/>
+        </p:nvPicPr>
+        <p:blipFill>
+          <a:blip r:embed="rId2"/>
+          <a:stretch>
+            <a:fillRect/>
+          </a:stretch>
+        </p:blipFill>
+        <p:spPr>
+          <a:xfrm>
+            <a:off x="1271697" y="2168481"/>
+            <a:ext cx="4502570" cy="2195002"/>
+          </a:xfrm>
+          <a:prstGeom prst="rect">
+            <a:avLst/>
+          </a:prstGeom>
+        </p:spPr>
+      </p:pic>
+      <p:cxnSp>
+        <p:nvCxnSpPr>
+          <p:cNvPr id="19" name="Straight Connector 18">
+            <a:extLst>
+              <a:ext uri="{FF2B5EF4-FFF2-40B4-BE49-F238E27FC236}">
+                <a16:creationId xmlns:a16="http://schemas.microsoft.com/office/drawing/2014/main" id="{A8FFEFAE-4471-4EAA-92D7-76C13B4D4513}"/>
+              </a:ext>
+              <a:ext uri="{C183D7F6-B498-43B3-948B-1728B52AA6E4}">
+                <adec:decorative xmlns:adec="http://schemas.microsoft.com/office/drawing/2017/decorative" val="1"/>
+              </a:ext>
+            </a:extLst>
+          </p:cNvPr>
+          <p:cNvCxnSpPr>
+            <a:cxnSpLocks noGrp="1" noRot="1" noChangeAspect="1" noMove="1" noResize="1" noEditPoints="1" noAdjustHandles="1" noChangeArrowheads="1" noChangeShapeType="1"/>
+          </p:cNvCxnSpPr>
+          <p:nvPr>
+            <p:extLst>
+              <p:ext uri="{386F3935-93C4-4BCD-93E2-E3B085C9AB24}">
+                <p16:designElem xmlns:p16="http://schemas.microsoft.com/office/powerpoint/2015/main" val="1"/>
+              </p:ext>
+            </p:extLst>
+          </p:nvPr>
+        </p:nvCxnSpPr>
+        <p:spPr>
+          <a:xfrm>
+            <a:off x="6096001" y="1593669"/>
+            <a:ext cx="0" cy="3222171"/>
+          </a:xfrm>
+          <a:prstGeom prst="line">
+            <a:avLst/>
+          </a:prstGeom>
+          <a:ln>
+            <a:solidFill>
+              <a:schemeClr val="accent1">
+                <a:alpha val="60000"/>
+              </a:schemeClr>
+            </a:solidFill>
+          </a:ln>
+        </p:spPr>
+        <p:style>
+          <a:lnRef idx="1">
+            <a:schemeClr val="accent1"/>
+          </a:lnRef>
+          <a:fillRef idx="0">
+            <a:schemeClr val="accent1"/>
+          </a:fillRef>
+          <a:effectRef idx="0">
+            <a:schemeClr val="accent1"/>
+          </a:effectRef>
+          <a:fontRef idx="minor">
+            <a:schemeClr val="tx1"/>
+          </a:fontRef>
+        </p:style>
+      </p:cxnSp>
+      <p:pic>
+        <p:nvPicPr>
+          <p:cNvPr id="3" name="Рисунок 2" descr="Tproger » KISOV BORIS">
+            <a:extLst>
+              <a:ext uri="{FF2B5EF4-FFF2-40B4-BE49-F238E27FC236}">
+                <a16:creationId xmlns:a16="http://schemas.microsoft.com/office/drawing/2014/main" id="{E89CAC73-8B6E-9877-5C4D-1D91C54BCB9E}"/>
+              </a:ext>
+            </a:extLst>
+          </p:cNvPr>
+          <p:cNvPicPr>
+            <a:picLocks noChangeAspect="1"/>
+          </p:cNvPicPr>
+          <p:nvPr/>
+        </p:nvPicPr>
+        <p:blipFill>
+          <a:blip r:embed="rId3"/>
+          <a:stretch>
+            <a:fillRect/>
+          </a:stretch>
+        </p:blipFill>
+        <p:spPr>
+          <a:xfrm>
+            <a:off x="6417735" y="2258532"/>
+            <a:ext cx="4502570" cy="2014900"/>
+          </a:xfrm>
+          <a:prstGeom prst="rect">
+            <a:avLst/>
+          </a:prstGeom>
+        </p:spPr>
+      </p:pic>
+    </p:spTree>
+    <p:extLst>
+      <p:ext uri="{BB962C8B-B14F-4D97-AF65-F5344CB8AC3E}">
+        <p14:creationId xmlns:p14="http://schemas.microsoft.com/office/powerpoint/2010/main" val="3218472546"/>
+      </p:ext>
+    </p:extLst>
+  </p:cSld>
+  <p:clrMapOvr>
+    <a:masterClrMapping/>
+  </p:clrMapOvr>
+</p:sld>
+</file>
+
+<file path=ppt/slides/slide11.xml><?xml version="1.0" encoding="utf-8"?>
+<p:sld xmlns:a="http://schemas.openxmlformats.org/drawingml/2006/main" xmlns:r="http://schemas.openxmlformats.org/officeDocument/2006/relationships" xmlns:p="http://schemas.openxmlformats.org/presentationml/2006/main">
+  <p:cSld>
+    <p:spTree>
+      <p:nvGrpSpPr>
+        <p:cNvPr id="1" name="">
+          <a:extLst>
+            <a:ext uri="{FF2B5EF4-FFF2-40B4-BE49-F238E27FC236}">
+              <a16:creationId xmlns:a16="http://schemas.microsoft.com/office/drawing/2014/main" id="{91A5D8CA-A502-1748-BE54-180C95B6202A}"/>
+            </a:ext>
+          </a:extLst>
+        </p:cNvPr>
+        <p:cNvGrpSpPr/>
+        <p:nvPr/>
+      </p:nvGrpSpPr>
+      <p:grpSpPr>
+        <a:xfrm>
+          <a:off x="0" y="0"/>
+          <a:ext cx="0" cy="0"/>
+          <a:chOff x="0" y="0"/>
+          <a:chExt cx="0" cy="0"/>
+        </a:xfrm>
+      </p:grpSpPr>
+      <p:sp>
+        <p:nvSpPr>
+          <p:cNvPr id="2" name="Title 1">
+            <a:extLst>
+              <a:ext uri="{FF2B5EF4-FFF2-40B4-BE49-F238E27FC236}">
+                <a16:creationId xmlns:a16="http://schemas.microsoft.com/office/drawing/2014/main" id="{D5AA0F46-3489-0CD4-DDDD-D86CCF061287}"/>
+              </a:ext>
+            </a:extLst>
+          </p:cNvPr>
+          <p:cNvSpPr>
+            <a:spLocks noGrp="1"/>
+          </p:cNvSpPr>
+          <p:nvPr>
+            <p:ph type="title"/>
+          </p:nvPr>
+        </p:nvSpPr>
+        <p:spPr>
+          <a:xfrm>
+            <a:off x="5423317" y="1907226"/>
+            <a:ext cx="1295401" cy="1507067"/>
+          </a:xfrm>
+        </p:spPr>
+        <p:txBody>
+          <a:bodyPr/>
+          <a:lstStyle/>
+          <a:p>
+            <a:r>
+              <a:rPr lang="en-US" dirty="0"/>
+              <a:t>Title</a:t>
+            </a:r>
+          </a:p>
+        </p:txBody>
+      </p:sp>
+      <p:sp>
+        <p:nvSpPr>
+          <p:cNvPr id="8" name="Title 1">
+            <a:extLst>
+              <a:ext uri="{FF2B5EF4-FFF2-40B4-BE49-F238E27FC236}">
+                <a16:creationId xmlns:a16="http://schemas.microsoft.com/office/drawing/2014/main" id="{9847FF8F-9986-7A47-76C1-181B29DE4C17}"/>
+              </a:ext>
+            </a:extLst>
+          </p:cNvPr>
+          <p:cNvSpPr txBox="1">
+            <a:spLocks/>
+          </p:cNvSpPr>
+          <p:nvPr/>
+        </p:nvSpPr>
+        <p:spPr>
+          <a:xfrm>
+            <a:off x="5421980" y="2661206"/>
+            <a:ext cx="1295401" cy="1507067"/>
+          </a:xfrm>
+          <a:prstGeom prst="rect">
+            <a:avLst/>
+          </a:prstGeom>
+          <a:effectLst/>
+        </p:spPr>
+        <p:txBody>
+          <a:bodyPr vert="horz" lIns="91440" tIns="45720" rIns="91440" bIns="45720" rtlCol="0" anchor="ctr">
+            <a:normAutofit/>
+          </a:bodyPr>
+          <a:lstStyle>
+            <a:lvl1pPr algn="l" defTabSz="457200" rtl="0" eaLnBrk="1" latinLnBrk="0" hangingPunct="1">
+              <a:spcBef>
+                <a:spcPct val="0"/>
+              </a:spcBef>
+              <a:buNone/>
+              <a:defRPr sz="3600" kern="1200" cap="all">
+                <a:ln w="3175" cmpd="sng">
+                  <a:noFill/>
+                </a:ln>
+                <a:solidFill>
+                  <a:schemeClr val="tx1"/>
+                </a:solidFill>
+                <a:effectLst/>
+                <a:latin typeface="+mj-lt"/>
+                <a:ea typeface="+mj-ea"/>
+                <a:cs typeface="+mj-cs"/>
+              </a:defRPr>
+            </a:lvl1pPr>
+            <a:lvl2pPr eaLnBrk="1" hangingPunct="1">
+              <a:defRPr>
+                <a:solidFill>
+                  <a:schemeClr val="tx2"/>
+                </a:solidFill>
+              </a:defRPr>
+            </a:lvl2pPr>
+            <a:lvl3pPr eaLnBrk="1" hangingPunct="1">
+              <a:defRPr>
+                <a:solidFill>
+                  <a:schemeClr val="tx2"/>
+                </a:solidFill>
+              </a:defRPr>
+            </a:lvl3pPr>
+            <a:lvl4pPr eaLnBrk="1" hangingPunct="1">
+              <a:defRPr>
+                <a:solidFill>
+                  <a:schemeClr val="tx2"/>
+                </a:solidFill>
+              </a:defRPr>
+            </a:lvl4pPr>
+            <a:lvl5pPr eaLnBrk="1" hangingPunct="1">
+              <a:defRPr>
+                <a:solidFill>
+                  <a:schemeClr val="tx2"/>
+                </a:solidFill>
+              </a:defRPr>
+            </a:lvl5pPr>
+            <a:lvl6pPr eaLnBrk="1" hangingPunct="1">
+              <a:defRPr>
+                <a:solidFill>
+                  <a:schemeClr val="tx2"/>
+                </a:solidFill>
+              </a:defRPr>
+            </a:lvl6pPr>
+            <a:lvl7pPr eaLnBrk="1" hangingPunct="1">
+              <a:defRPr>
+                <a:solidFill>
+                  <a:schemeClr val="tx2"/>
+                </a:solidFill>
+              </a:defRPr>
+            </a:lvl7pPr>
+            <a:lvl8pPr eaLnBrk="1" hangingPunct="1">
+              <a:defRPr>
+                <a:solidFill>
+                  <a:schemeClr val="tx2"/>
+                </a:solidFill>
+              </a:defRPr>
+            </a:lvl8pPr>
+            <a:lvl9pPr eaLnBrk="1" hangingPunct="1">
+              <a:defRPr>
+                <a:solidFill>
+                  <a:schemeClr val="tx2"/>
+                </a:solidFill>
+              </a:defRPr>
+            </a:lvl9pPr>
+          </a:lstStyle>
+          <a:p>
+            <a:r>
+              <a:rPr lang="en-US" dirty="0"/>
+              <a:t>Text</a:t>
+            </a:r>
+          </a:p>
+        </p:txBody>
+      </p:sp>
+      <p:sp>
+        <p:nvSpPr>
+          <p:cNvPr id="10" name="Title 1">
+            <a:extLst>
+              <a:ext uri="{FF2B5EF4-FFF2-40B4-BE49-F238E27FC236}">
+                <a16:creationId xmlns:a16="http://schemas.microsoft.com/office/drawing/2014/main" id="{BD25786B-51C2-3E1D-C960-409536EBB5B0}"/>
+              </a:ext>
+            </a:extLst>
+          </p:cNvPr>
+          <p:cNvSpPr txBox="1">
+            <a:spLocks/>
+          </p:cNvSpPr>
+          <p:nvPr/>
+        </p:nvSpPr>
+        <p:spPr>
+          <a:xfrm>
+            <a:off x="5134559" y="3416522"/>
+            <a:ext cx="1870243" cy="1507067"/>
+          </a:xfrm>
+          <a:prstGeom prst="rect">
+            <a:avLst/>
+          </a:prstGeom>
+          <a:effectLst/>
+        </p:spPr>
+        <p:txBody>
+          <a:bodyPr vert="horz" lIns="91440" tIns="45720" rIns="91440" bIns="45720" rtlCol="0" anchor="ctr">
+            <a:normAutofit/>
+          </a:bodyPr>
+          <a:lstStyle>
+            <a:lvl1pPr algn="l" defTabSz="457200" rtl="0" eaLnBrk="1" latinLnBrk="0" hangingPunct="1">
+              <a:spcBef>
+                <a:spcPct val="0"/>
+              </a:spcBef>
+              <a:buNone/>
+              <a:defRPr sz="3600" kern="1200" cap="all">
+                <a:ln w="3175" cmpd="sng">
+                  <a:noFill/>
+                </a:ln>
+                <a:solidFill>
+                  <a:schemeClr val="tx1"/>
+                </a:solidFill>
+                <a:effectLst/>
+                <a:latin typeface="+mj-lt"/>
+                <a:ea typeface="+mj-ea"/>
+                <a:cs typeface="+mj-cs"/>
+              </a:defRPr>
+            </a:lvl1pPr>
+            <a:lvl2pPr eaLnBrk="1" hangingPunct="1">
+              <a:defRPr>
+                <a:solidFill>
+                  <a:schemeClr val="tx2"/>
+                </a:solidFill>
+              </a:defRPr>
+            </a:lvl2pPr>
+            <a:lvl3pPr eaLnBrk="1" hangingPunct="1">
+              <a:defRPr>
+                <a:solidFill>
+                  <a:schemeClr val="tx2"/>
+                </a:solidFill>
+              </a:defRPr>
+            </a:lvl3pPr>
+            <a:lvl4pPr eaLnBrk="1" hangingPunct="1">
+              <a:defRPr>
+                <a:solidFill>
+                  <a:schemeClr val="tx2"/>
+                </a:solidFill>
+              </a:defRPr>
+            </a:lvl4pPr>
+            <a:lvl5pPr eaLnBrk="1" hangingPunct="1">
+              <a:defRPr>
+                <a:solidFill>
+                  <a:schemeClr val="tx2"/>
+                </a:solidFill>
+              </a:defRPr>
+            </a:lvl5pPr>
+            <a:lvl6pPr eaLnBrk="1" hangingPunct="1">
+              <a:defRPr>
+                <a:solidFill>
+                  <a:schemeClr val="tx2"/>
+                </a:solidFill>
+              </a:defRPr>
+            </a:lvl6pPr>
+            <a:lvl7pPr eaLnBrk="1" hangingPunct="1">
+              <a:defRPr>
+                <a:solidFill>
+                  <a:schemeClr val="tx2"/>
+                </a:solidFill>
+              </a:defRPr>
+            </a:lvl7pPr>
+            <a:lvl8pPr eaLnBrk="1" hangingPunct="1">
+              <a:defRPr>
+                <a:solidFill>
+                  <a:schemeClr val="tx2"/>
+                </a:solidFill>
+              </a:defRPr>
+            </a:lvl8pPr>
+            <a:lvl9pPr eaLnBrk="1" hangingPunct="1">
+              <a:defRPr>
+                <a:solidFill>
+                  <a:schemeClr val="tx2"/>
+                </a:solidFill>
+              </a:defRPr>
+            </a:lvl9pPr>
+          </a:lstStyle>
+          <a:p>
+            <a:r>
+              <a:rPr lang="en-US" dirty="0"/>
+              <a:t>image</a:t>
+            </a:r>
+            <a:endParaRPr lang="ru-RU" dirty="0"/>
+          </a:p>
+        </p:txBody>
+      </p:sp>
+      <p:sp>
+        <p:nvSpPr>
+          <p:cNvPr id="12" name="Title 1">
+            <a:extLst>
+              <a:ext uri="{FF2B5EF4-FFF2-40B4-BE49-F238E27FC236}">
+                <a16:creationId xmlns:a16="http://schemas.microsoft.com/office/drawing/2014/main" id="{13000FAF-3B85-B503-75E5-787017EB8FE6}"/>
+              </a:ext>
+            </a:extLst>
+          </p:cNvPr>
+          <p:cNvSpPr txBox="1">
+            <a:spLocks/>
+          </p:cNvSpPr>
+          <p:nvPr/>
+        </p:nvSpPr>
+        <p:spPr>
+          <a:xfrm>
+            <a:off x="5421981" y="4171837"/>
+            <a:ext cx="1295401" cy="1507067"/>
+          </a:xfrm>
+          <a:prstGeom prst="rect">
+            <a:avLst/>
+          </a:prstGeom>
+          <a:effectLst/>
+        </p:spPr>
+        <p:txBody>
+          <a:bodyPr vert="horz" lIns="91440" tIns="45720" rIns="91440" bIns="45720" rtlCol="0" anchor="ctr">
+            <a:normAutofit/>
+          </a:bodyPr>
+          <a:lstStyle>
+            <a:lvl1pPr algn="l" defTabSz="457200" rtl="0" eaLnBrk="1" latinLnBrk="0" hangingPunct="1">
+              <a:spcBef>
+                <a:spcPct val="0"/>
+              </a:spcBef>
+              <a:buNone/>
+              <a:defRPr sz="3600" kern="1200" cap="all">
+                <a:ln w="3175" cmpd="sng">
+                  <a:noFill/>
+                </a:ln>
+                <a:solidFill>
+                  <a:schemeClr val="tx1"/>
+                </a:solidFill>
+                <a:effectLst/>
+                <a:latin typeface="+mj-lt"/>
+                <a:ea typeface="+mj-ea"/>
+                <a:cs typeface="+mj-cs"/>
+              </a:defRPr>
+            </a:lvl1pPr>
+            <a:lvl2pPr eaLnBrk="1" hangingPunct="1">
+              <a:defRPr>
+                <a:solidFill>
+                  <a:schemeClr val="tx2"/>
+                </a:solidFill>
+              </a:defRPr>
+            </a:lvl2pPr>
+            <a:lvl3pPr eaLnBrk="1" hangingPunct="1">
+              <a:defRPr>
+                <a:solidFill>
+                  <a:schemeClr val="tx2"/>
+                </a:solidFill>
+              </a:defRPr>
+            </a:lvl3pPr>
+            <a:lvl4pPr eaLnBrk="1" hangingPunct="1">
+              <a:defRPr>
+                <a:solidFill>
+                  <a:schemeClr val="tx2"/>
+                </a:solidFill>
+              </a:defRPr>
+            </a:lvl4pPr>
+            <a:lvl5pPr eaLnBrk="1" hangingPunct="1">
+              <a:defRPr>
+                <a:solidFill>
+                  <a:schemeClr val="tx2"/>
+                </a:solidFill>
+              </a:defRPr>
+            </a:lvl5pPr>
+            <a:lvl6pPr eaLnBrk="1" hangingPunct="1">
+              <a:defRPr>
+                <a:solidFill>
+                  <a:schemeClr val="tx2"/>
+                </a:solidFill>
+              </a:defRPr>
+            </a:lvl6pPr>
+            <a:lvl7pPr eaLnBrk="1" hangingPunct="1">
+              <a:defRPr>
+                <a:solidFill>
+                  <a:schemeClr val="tx2"/>
+                </a:solidFill>
+              </a:defRPr>
+            </a:lvl7pPr>
+            <a:lvl8pPr eaLnBrk="1" hangingPunct="1">
+              <a:defRPr>
+                <a:solidFill>
+                  <a:schemeClr val="tx2"/>
+                </a:solidFill>
+              </a:defRPr>
+            </a:lvl8pPr>
+            <a:lvl9pPr eaLnBrk="1" hangingPunct="1">
+              <a:defRPr>
+                <a:solidFill>
+                  <a:schemeClr val="tx2"/>
+                </a:solidFill>
+              </a:defRPr>
+            </a:lvl9pPr>
+          </a:lstStyle>
+          <a:p>
+            <a:r>
+              <a:rPr lang="en-US" dirty="0"/>
+              <a:t>link</a:t>
+            </a:r>
+            <a:endParaRPr lang="ru-RU" dirty="0"/>
+          </a:p>
+        </p:txBody>
+      </p:sp>
+      <p:sp>
+        <p:nvSpPr>
+          <p:cNvPr id="14" name="Title 1">
+            <a:extLst>
+              <a:ext uri="{FF2B5EF4-FFF2-40B4-BE49-F238E27FC236}">
+                <a16:creationId xmlns:a16="http://schemas.microsoft.com/office/drawing/2014/main" id="{04D48F18-C823-61E3-C511-471F91D5A03F}"/>
+              </a:ext>
+            </a:extLst>
+          </p:cNvPr>
+          <p:cNvSpPr txBox="1">
+            <a:spLocks/>
+          </p:cNvSpPr>
+          <p:nvPr/>
+        </p:nvSpPr>
+        <p:spPr>
+          <a:xfrm>
+            <a:off x="3048805" y="398123"/>
+            <a:ext cx="6093315" cy="1507067"/>
+          </a:xfrm>
+          <a:prstGeom prst="rect">
+            <a:avLst/>
+          </a:prstGeom>
+          <a:effectLst/>
+        </p:spPr>
+        <p:txBody>
+          <a:bodyPr vert="horz" lIns="91440" tIns="45720" rIns="91440" bIns="45720" rtlCol="0" anchor="ctr">
+            <a:normAutofit/>
+          </a:bodyPr>
+          <a:lstStyle>
+            <a:lvl1pPr algn="l" defTabSz="457200" rtl="0" eaLnBrk="1" latinLnBrk="0" hangingPunct="1">
+              <a:spcBef>
+                <a:spcPct val="0"/>
+              </a:spcBef>
+              <a:buNone/>
+              <a:defRPr sz="3600" kern="1200" cap="all">
+                <a:ln w="3175" cmpd="sng">
+                  <a:noFill/>
+                </a:ln>
+                <a:solidFill>
+                  <a:schemeClr val="tx1"/>
+                </a:solidFill>
+                <a:effectLst/>
+                <a:latin typeface="+mj-lt"/>
+                <a:ea typeface="+mj-ea"/>
+                <a:cs typeface="+mj-cs"/>
+              </a:defRPr>
+            </a:lvl1pPr>
+            <a:lvl2pPr eaLnBrk="1" hangingPunct="1">
+              <a:defRPr>
+                <a:solidFill>
+                  <a:schemeClr val="tx2"/>
+                </a:solidFill>
+              </a:defRPr>
+            </a:lvl2pPr>
+            <a:lvl3pPr eaLnBrk="1" hangingPunct="1">
+              <a:defRPr>
+                <a:solidFill>
+                  <a:schemeClr val="tx2"/>
+                </a:solidFill>
+              </a:defRPr>
+            </a:lvl3pPr>
+            <a:lvl4pPr eaLnBrk="1" hangingPunct="1">
+              <a:defRPr>
+                <a:solidFill>
+                  <a:schemeClr val="tx2"/>
+                </a:solidFill>
+              </a:defRPr>
+            </a:lvl4pPr>
+            <a:lvl5pPr eaLnBrk="1" hangingPunct="1">
+              <a:defRPr>
+                <a:solidFill>
+                  <a:schemeClr val="tx2"/>
+                </a:solidFill>
+              </a:defRPr>
+            </a:lvl5pPr>
+            <a:lvl6pPr eaLnBrk="1" hangingPunct="1">
+              <a:defRPr>
+                <a:solidFill>
+                  <a:schemeClr val="tx2"/>
+                </a:solidFill>
+              </a:defRPr>
+            </a:lvl6pPr>
+            <a:lvl7pPr eaLnBrk="1" hangingPunct="1">
+              <a:defRPr>
+                <a:solidFill>
+                  <a:schemeClr val="tx2"/>
+                </a:solidFill>
+              </a:defRPr>
+            </a:lvl7pPr>
+            <a:lvl8pPr eaLnBrk="1" hangingPunct="1">
+              <a:defRPr>
+                <a:solidFill>
+                  <a:schemeClr val="tx2"/>
+                </a:solidFill>
+              </a:defRPr>
+            </a:lvl8pPr>
+            <a:lvl9pPr eaLnBrk="1" hangingPunct="1">
+              <a:defRPr>
+                <a:solidFill>
+                  <a:schemeClr val="tx2"/>
+                </a:solidFill>
+              </a:defRPr>
+            </a:lvl9pPr>
+          </a:lstStyle>
+          <a:p>
+            <a:r>
+              <a:rPr lang="en-US" sz="4400" dirty="0" err="1"/>
+              <a:t>Структура</a:t>
+            </a:r>
+            <a:r>
+              <a:rPr lang="en-US" sz="4400" dirty="0"/>
+              <a:t> </a:t>
+            </a:r>
+            <a:r>
+              <a:rPr lang="en-US" sz="4400" dirty="0" err="1"/>
+              <a:t>статьи</a:t>
+            </a:r>
+          </a:p>
+        </p:txBody>
+      </p:sp>
+      <p:sp>
+        <p:nvSpPr>
+          <p:cNvPr id="18" name="Прямоугольник: скругленные углы 17">
+            <a:extLst>
+              <a:ext uri="{FF2B5EF4-FFF2-40B4-BE49-F238E27FC236}">
+                <a16:creationId xmlns:a16="http://schemas.microsoft.com/office/drawing/2014/main" id="{8F2BD75E-6B5C-3122-AA91-99B61FD06345}"/>
+              </a:ext>
+            </a:extLst>
+          </p:cNvPr>
+          <p:cNvSpPr/>
+          <p:nvPr/>
+        </p:nvSpPr>
+        <p:spPr>
+          <a:xfrm>
+            <a:off x="4650668" y="1993699"/>
+            <a:ext cx="2663504" cy="3893889"/>
+          </a:xfrm>
+          <a:prstGeom prst="roundRect">
+            <a:avLst/>
+          </a:prstGeom>
+          <a:noFill/>
+          <a:ln w="57150">
+            <a:solidFill>
+              <a:schemeClr val="tx1">
+                <a:lumMod val="85000"/>
+                <a:lumOff val="15000"/>
+              </a:schemeClr>
+            </a:solidFill>
+          </a:ln>
+        </p:spPr>
+        <p:style>
+          <a:lnRef idx="2">
+            <a:schemeClr val="accent1">
+              <a:shade val="15000"/>
+            </a:schemeClr>
+          </a:lnRef>
+          <a:fillRef idx="1">
+            <a:schemeClr val="accent1"/>
+          </a:fillRef>
+          <a:effectRef idx="0">
+            <a:schemeClr val="accent1"/>
+          </a:effectRef>
+          <a:fontRef idx="minor">
+            <a:schemeClr val="lt1"/>
+          </a:fontRef>
+        </p:style>
+        <p:txBody>
+          <a:bodyPr rtlCol="0" anchor="ctr"/>
+          <a:lstStyle/>
+          <a:p>
+            <a:pPr algn="ctr"/>
+            <a:endParaRPr lang="ru-RU"/>
+          </a:p>
+        </p:txBody>
+      </p:sp>
+    </p:spTree>
+    <p:extLst>
+      <p:ext uri="{BB962C8B-B14F-4D97-AF65-F5344CB8AC3E}">
+        <p14:creationId xmlns:p14="http://schemas.microsoft.com/office/powerpoint/2010/main" val="2671369299"/>
+      </p:ext>
+    </p:extLst>
+  </p:cSld>
+  <p:clrMapOvr>
+    <a:masterClrMapping/>
+  </p:clrMapOvr>
+</p:sld>
+</file>
+
+<file path=ppt/slides/slide12.xml><?xml version="1.0" encoding="utf-8"?>
+<p:sld xmlns:a="http://schemas.openxmlformats.org/drawingml/2006/main" xmlns:r="http://schemas.openxmlformats.org/officeDocument/2006/relationships" xmlns:p="http://schemas.openxmlformats.org/presentationml/2006/main">
+  <p:cSld>
+    <p:spTree>
+      <p:nvGrpSpPr>
+        <p:cNvPr id="1" name="">
+          <a:extLst>
+            <a:ext uri="{FF2B5EF4-FFF2-40B4-BE49-F238E27FC236}">
+              <a16:creationId xmlns:a16="http://schemas.microsoft.com/office/drawing/2014/main" id="{0587F3BD-7B82-4328-294C-852349708426}"/>
+            </a:ext>
+          </a:extLst>
+        </p:cNvPr>
+        <p:cNvGrpSpPr/>
+        <p:nvPr/>
+      </p:nvGrpSpPr>
+      <p:grpSpPr>
+        <a:xfrm>
+          <a:off x="0" y="0"/>
+          <a:ext cx="0" cy="0"/>
+          <a:chOff x="0" y="0"/>
+          <a:chExt cx="0" cy="0"/>
+        </a:xfrm>
+      </p:grpSpPr>
+      <p:sp>
+        <p:nvSpPr>
+          <p:cNvPr id="4" name="Заголовок 3">
+            <a:extLst>
+              <a:ext uri="{FF2B5EF4-FFF2-40B4-BE49-F238E27FC236}">
+                <a16:creationId xmlns:a16="http://schemas.microsoft.com/office/drawing/2014/main" id="{C0566488-B287-5CB7-CCA8-7C9429FAA965}"/>
+              </a:ext>
+            </a:extLst>
+          </p:cNvPr>
+          <p:cNvSpPr>
+            <a:spLocks noGrp="1"/>
+          </p:cNvSpPr>
+          <p:nvPr>
+            <p:ph type="title"/>
+          </p:nvPr>
+        </p:nvSpPr>
+        <p:spPr>
+          <a:xfrm>
+            <a:off x="4494624" y="83112"/>
+            <a:ext cx="3199578" cy="1507067"/>
+          </a:xfrm>
+        </p:spPr>
+        <p:txBody>
+          <a:bodyPr>
+            <a:normAutofit/>
+          </a:bodyPr>
+          <a:lstStyle/>
+          <a:p>
+            <a:r>
+              <a:rPr lang="ru-RU" dirty="0"/>
+              <a:t>Теги сайта</a:t>
+            </a:r>
+          </a:p>
+        </p:txBody>
+      </p:sp>
+      <p:pic>
+        <p:nvPicPr>
+          <p:cNvPr id="2" name="Рисунок 1" descr="Изображение выглядит как текст, снимок экрана, Шрифт, программное обеспечение&#10;&#10;Автоматически созданное описание">
+            <a:extLst>
+              <a:ext uri="{FF2B5EF4-FFF2-40B4-BE49-F238E27FC236}">
+                <a16:creationId xmlns:a16="http://schemas.microsoft.com/office/drawing/2014/main" id="{A4B77A55-A5CC-1515-EB3A-AE1085622910}"/>
+              </a:ext>
+            </a:extLst>
+          </p:cNvPr>
+          <p:cNvPicPr>
+            <a:picLocks noChangeAspect="1"/>
+          </p:cNvPicPr>
+          <p:nvPr/>
+        </p:nvPicPr>
+        <p:blipFill>
+          <a:blip r:embed="rId2"/>
+          <a:stretch>
+            <a:fillRect/>
+          </a:stretch>
+        </p:blipFill>
+        <p:spPr>
+          <a:xfrm>
+            <a:off x="2782801" y="1515834"/>
+            <a:ext cx="6630099" cy="4680445"/>
+          </a:xfrm>
+          <a:prstGeom prst="rect">
+            <a:avLst/>
+          </a:prstGeom>
+        </p:spPr>
+      </p:pic>
+    </p:spTree>
+    <p:extLst>
+      <p:ext uri="{BB962C8B-B14F-4D97-AF65-F5344CB8AC3E}">
+        <p14:creationId xmlns:p14="http://schemas.microsoft.com/office/powerpoint/2010/main" val="2367180214"/>
+      </p:ext>
+    </p:extLst>
+  </p:cSld>
+  <p:clrMapOvr>
+    <a:masterClrMapping/>
+  </p:clrMapOvr>
+</p:sld>
+</file>
+
+<file path=ppt/slides/slide13.xml><?xml version="1.0" encoding="utf-8"?>
+<p:sld xmlns:a="http://schemas.openxmlformats.org/drawingml/2006/main" xmlns:r="http://schemas.openxmlformats.org/officeDocument/2006/relationships" xmlns:p="http://schemas.openxmlformats.org/presentationml/2006/main">
+  <p:cSld>
+    <p:spTree>
+      <p:nvGrpSpPr>
+        <p:cNvPr id="1" name="">
+          <a:extLst>
+            <a:ext uri="{FF2B5EF4-FFF2-40B4-BE49-F238E27FC236}">
+              <a16:creationId xmlns:a16="http://schemas.microsoft.com/office/drawing/2014/main" id="{26014CA0-57C9-70D6-572B-E2305E3C8997}"/>
+            </a:ext>
+          </a:extLst>
+        </p:cNvPr>
+        <p:cNvGrpSpPr/>
+        <p:nvPr/>
+      </p:nvGrpSpPr>
+      <p:grpSpPr>
+        <a:xfrm>
+          <a:off x="0" y="0"/>
+          <a:ext cx="0" cy="0"/>
+          <a:chOff x="0" y="0"/>
+          <a:chExt cx="0" cy="0"/>
+        </a:xfrm>
+      </p:grpSpPr>
+      <p:pic>
+        <p:nvPicPr>
+          <p:cNvPr id="5" name="Рисунок 4" descr="Изображение выглядит как текст, снимок экрана, программное обеспечение, Шрифт&#10;&#10;Автоматически созданное описание">
+            <a:extLst>
+              <a:ext uri="{FF2B5EF4-FFF2-40B4-BE49-F238E27FC236}">
+                <a16:creationId xmlns:a16="http://schemas.microsoft.com/office/drawing/2014/main" id="{E62AFFE6-CC3F-A151-22FE-28528AD60F27}"/>
+              </a:ext>
+            </a:extLst>
+          </p:cNvPr>
+          <p:cNvPicPr>
+            <a:picLocks noChangeAspect="1"/>
+          </p:cNvPicPr>
+          <p:nvPr/>
+        </p:nvPicPr>
+        <p:blipFill>
+          <a:blip r:embed="rId2"/>
+          <a:stretch>
+            <a:fillRect/>
+          </a:stretch>
+        </p:blipFill>
+        <p:spPr>
+          <a:xfrm>
+            <a:off x="2110574" y="1717514"/>
+            <a:ext cx="7970853" cy="4310806"/>
+          </a:xfrm>
+          <a:prstGeom prst="rect">
+            <a:avLst/>
+          </a:prstGeom>
+        </p:spPr>
+      </p:pic>
+      <p:sp>
+        <p:nvSpPr>
+          <p:cNvPr id="4" name="Заголовок 3">
+            <a:extLst>
+              <a:ext uri="{FF2B5EF4-FFF2-40B4-BE49-F238E27FC236}">
+                <a16:creationId xmlns:a16="http://schemas.microsoft.com/office/drawing/2014/main" id="{F1836F32-8D3F-369A-863B-ED7F61582309}"/>
+              </a:ext>
+            </a:extLst>
+          </p:cNvPr>
+          <p:cNvSpPr>
+            <a:spLocks noGrp="1"/>
+          </p:cNvSpPr>
+          <p:nvPr>
+            <p:ph type="title"/>
+          </p:nvPr>
+        </p:nvSpPr>
+        <p:spPr>
+          <a:xfrm>
+            <a:off x="3508506" y="83112"/>
+            <a:ext cx="5171813" cy="1507067"/>
+          </a:xfrm>
+        </p:spPr>
+        <p:txBody>
+          <a:bodyPr>
+            <a:normAutofit/>
+          </a:bodyPr>
+          <a:lstStyle/>
+          <a:p>
+            <a:r>
+              <a:rPr lang="ru-RU" dirty="0"/>
+              <a:t>Описание сайта</a:t>
+            </a:r>
+          </a:p>
+        </p:txBody>
+      </p:sp>
+    </p:spTree>
+    <p:extLst>
+      <p:ext uri="{BB962C8B-B14F-4D97-AF65-F5344CB8AC3E}">
+        <p14:creationId xmlns:p14="http://schemas.microsoft.com/office/powerpoint/2010/main" val="404382374"/>
+      </p:ext>
+    </p:extLst>
+  </p:cSld>
+  <p:clrMapOvr>
+    <a:masterClrMapping/>
+  </p:clrMapOvr>
+</p:sld>
+</file>
+
+<file path=ppt/slides/slide14.xml><?xml version="1.0" encoding="utf-8"?>
+<p:sld xmlns:a="http://schemas.openxmlformats.org/drawingml/2006/main" xmlns:r="http://schemas.openxmlformats.org/officeDocument/2006/relationships" xmlns:p="http://schemas.openxmlformats.org/presentationml/2006/main">
+  <p:cSld>
+    <p:spTree>
+      <p:nvGrpSpPr>
+        <p:cNvPr id="1" name=""/>
+        <p:cNvGrpSpPr/>
+        <p:nvPr/>
+      </p:nvGrpSpPr>
+      <p:grpSpPr>
+        <a:xfrm>
+          <a:off x="0" y="0"/>
+          <a:ext cx="0" cy="0"/>
+          <a:chOff x="0" y="0"/>
+          <a:chExt cx="0" cy="0"/>
+        </a:xfrm>
+      </p:grpSpPr>
+      <p:sp>
+        <p:nvSpPr>
+          <p:cNvPr id="3" name="Content Placeholder 2">
+            <a:extLst>
+              <a:ext uri="{FF2B5EF4-FFF2-40B4-BE49-F238E27FC236}">
+                <a16:creationId xmlns:a16="http://schemas.microsoft.com/office/drawing/2014/main" id="{3958B08C-BE6D-4A6C-A37B-0D95D91813C4}"/>
+              </a:ext>
+            </a:extLst>
+          </p:cNvPr>
+          <p:cNvSpPr>
+            <a:spLocks noGrp="1"/>
+          </p:cNvSpPr>
+          <p:nvPr>
+            <p:ph idx="1"/>
+          </p:nvPr>
+        </p:nvSpPr>
+        <p:spPr>
+          <a:xfrm>
+            <a:off x="915031" y="1156316"/>
+            <a:ext cx="9303167" cy="4401105"/>
+          </a:xfrm>
+        </p:spPr>
+        <p:txBody>
+          <a:bodyPr>
+            <a:normAutofit/>
+          </a:bodyPr>
+          <a:lstStyle/>
+          <a:p>
+            <a:pPr marL="0" indent="0">
+              <a:lnSpc>
+                <a:spcPct val="150000"/>
+              </a:lnSpc>
+              <a:buNone/>
+            </a:pPr>
+            <a:r>
+              <a:rPr lang="en-US" dirty="0">
+                <a:effectLst/>
+                <a:latin typeface="Times New Roman" panose="02020603050405020304" pitchFamily="18" charset="0"/>
+                <a:ea typeface="Times New Roman" panose="02020603050405020304" pitchFamily="18" charset="0"/>
+                <a:cs typeface="Times New Roman" panose="02020603050405020304" pitchFamily="18" charset="0"/>
+              </a:rPr>
+              <a:t>	</a:t>
+            </a:r>
+            <a:r>
+              <a:rPr lang="ru-RU" dirty="0">
+                <a:effectLst/>
+                <a:latin typeface="Times New Roman" panose="02020603050405020304" pitchFamily="18" charset="0"/>
+                <a:ea typeface="Times New Roman" panose="02020603050405020304" pitchFamily="18" charset="0"/>
+                <a:cs typeface="Times New Roman" panose="02020603050405020304" pitchFamily="18" charset="0"/>
+              </a:rPr>
+              <a:t>Разработка приложения, включающего в себя веб-</a:t>
+            </a:r>
+            <a:r>
+              <a:rPr lang="ru-RU" dirty="0" err="1">
+                <a:effectLst/>
+                <a:latin typeface="Times New Roman" panose="02020603050405020304" pitchFamily="18" charset="0"/>
+                <a:ea typeface="Times New Roman" panose="02020603050405020304" pitchFamily="18" charset="0"/>
+                <a:cs typeface="Times New Roman" panose="02020603050405020304" pitchFamily="18" charset="0"/>
+              </a:rPr>
+              <a:t>скрапинг</a:t>
+            </a:r>
+            <a:r>
+              <a:rPr lang="ru-RU" dirty="0">
+                <a:effectLst/>
+                <a:latin typeface="Times New Roman" panose="02020603050405020304" pitchFamily="18" charset="0"/>
+                <a:ea typeface="Times New Roman" panose="02020603050405020304" pitchFamily="18" charset="0"/>
+                <a:cs typeface="Times New Roman" panose="02020603050405020304" pitchFamily="18" charset="0"/>
+              </a:rPr>
+              <a:t>, управление базой данных и создание пользовательского интерфейса с использованием фреймворка </a:t>
+            </a:r>
+            <a:r>
+              <a:rPr lang="ru-RU" dirty="0" err="1">
+                <a:effectLst/>
+                <a:latin typeface="Times New Roman" panose="02020603050405020304" pitchFamily="18" charset="0"/>
+                <a:ea typeface="Times New Roman" panose="02020603050405020304" pitchFamily="18" charset="0"/>
+                <a:cs typeface="Times New Roman" panose="02020603050405020304" pitchFamily="18" charset="0"/>
+              </a:rPr>
+              <a:t>System.Windows.Forms</a:t>
+            </a:r>
+            <a:r>
+              <a:rPr lang="ru-RU" dirty="0">
+                <a:effectLst/>
+                <a:latin typeface="Times New Roman" panose="02020603050405020304" pitchFamily="18" charset="0"/>
+                <a:ea typeface="Times New Roman" panose="02020603050405020304" pitchFamily="18" charset="0"/>
+                <a:cs typeface="Times New Roman" panose="02020603050405020304" pitchFamily="18" charset="0"/>
+              </a:rPr>
+              <a:t>, представляет собой многогранный и увлекательный процесс. Взаимодействие с различными компонентами, такими как парсер сайта, база данных и API, требует системного подхода и глубокого понимания каждого элемента системы.</a:t>
+            </a:r>
+          </a:p>
+          <a:p>
+            <a:pPr marL="0" indent="0">
+              <a:lnSpc>
+                <a:spcPct val="150000"/>
+              </a:lnSpc>
+              <a:buNone/>
+            </a:pPr>
+            <a:r>
+              <a:rPr lang="en-US" dirty="0">
+                <a:latin typeface="Times New Roman" panose="02020603050405020304" pitchFamily="18" charset="0"/>
+                <a:cs typeface="Times New Roman" panose="02020603050405020304" pitchFamily="18" charset="0"/>
+              </a:rPr>
+              <a:t>	</a:t>
+            </a:r>
+            <a:r>
+              <a:rPr lang="ru-RU" dirty="0">
+                <a:latin typeface="Times New Roman" panose="02020603050405020304" pitchFamily="18" charset="0"/>
+                <a:cs typeface="Times New Roman" panose="02020603050405020304" pitchFamily="18" charset="0"/>
+              </a:rPr>
+              <a:t>Надеемся, вы бы пользовались таким приложением и нашли бы его полезным и удобным</a:t>
+            </a:r>
+          </a:p>
+        </p:txBody>
+      </p:sp>
+    </p:spTree>
+    <p:extLst>
+      <p:ext uri="{BB962C8B-B14F-4D97-AF65-F5344CB8AC3E}">
+        <p14:creationId xmlns:p14="http://schemas.microsoft.com/office/powerpoint/2010/main" val="1346782698"/>
+      </p:ext>
+    </p:extLst>
+  </p:cSld>
+  <p:clrMapOvr>
+    <a:masterClrMapping/>
+  </p:clrMapOvr>
+</p:sld>
+</file>
+
 <file path=ppt/slides/slide2.xml><?xml version="1.0" encoding="utf-8"?>
 <p:sld xmlns:a="http://schemas.openxmlformats.org/drawingml/2006/main" xmlns:r="http://schemas.openxmlformats.org/officeDocument/2006/relationships" xmlns:p="http://schemas.openxmlformats.org/presentationml/2006/main">
   <p:cSld>
@@ -12648,7 +14185,13 @@
   <p:cSld>
     <p:spTree>
       <p:nvGrpSpPr>
-        <p:cNvPr id="1" name=""/>
+        <p:cNvPr id="1" name="">
+          <a:extLst>
+            <a:ext uri="{FF2B5EF4-FFF2-40B4-BE49-F238E27FC236}">
+              <a16:creationId xmlns:a16="http://schemas.microsoft.com/office/drawing/2014/main" id="{8387D9E8-F285-CE66-9350-F8618CFDA3C8}"/>
+            </a:ext>
+          </a:extLst>
+        </p:cNvPr>
         <p:cNvGrpSpPr/>
         <p:nvPr/>
       </p:nvGrpSpPr>
@@ -12662,10 +14205,45 @@
       </p:grpSpPr>
       <p:sp>
         <p:nvSpPr>
+          <p:cNvPr id="2" name="Title 1">
+            <a:extLst>
+              <a:ext uri="{FF2B5EF4-FFF2-40B4-BE49-F238E27FC236}">
+                <a16:creationId xmlns:a16="http://schemas.microsoft.com/office/drawing/2014/main" id="{6B1ED9EE-8AAA-626E-ED75-35EA74490386}"/>
+              </a:ext>
+            </a:extLst>
+          </p:cNvPr>
+          <p:cNvSpPr>
+            <a:spLocks noGrp="1"/>
+          </p:cNvSpPr>
+          <p:nvPr>
+            <p:ph type="title"/>
+          </p:nvPr>
+        </p:nvSpPr>
+        <p:spPr>
+          <a:xfrm>
+            <a:off x="1287893" y="279316"/>
+            <a:ext cx="8534400" cy="1507067"/>
+          </a:xfrm>
+        </p:spPr>
+        <p:txBody>
+          <a:bodyPr>
+            <a:normAutofit/>
+          </a:bodyPr>
+          <a:lstStyle/>
+          <a:p>
+            <a:r>
+              <a:rPr lang="en-US" sz="6000" dirty="0" err="1"/>
+              <a:t>Парсинг</a:t>
+            </a:r>
+          </a:p>
+        </p:txBody>
+      </p:sp>
+      <p:sp>
+        <p:nvSpPr>
           <p:cNvPr id="3" name="Content Placeholder 2">
             <a:extLst>
               <a:ext uri="{FF2B5EF4-FFF2-40B4-BE49-F238E27FC236}">
-                <a16:creationId xmlns:a16="http://schemas.microsoft.com/office/drawing/2014/main" id="{3958B08C-BE6D-4A6C-A37B-0D95D91813C4}"/>
+                <a16:creationId xmlns:a16="http://schemas.microsoft.com/office/drawing/2014/main" id="{1F328FC2-01DA-296E-056B-D63D67C01579}"/>
               </a:ext>
             </a:extLst>
           </p:cNvPr>
@@ -12678,8 +14256,8 @@
         </p:nvSpPr>
         <p:spPr>
           <a:xfrm>
-            <a:off x="915031" y="1156316"/>
-            <a:ext cx="9303167" cy="4401105"/>
+            <a:off x="1003808" y="2177249"/>
+            <a:ext cx="7740697" cy="3615267"/>
           </a:xfrm>
         </p:spPr>
         <p:txBody>
@@ -12695,88 +14273,393 @@
               <a:buNone/>
             </a:pPr>
             <a:r>
-              <a:rPr lang="en-US" dirty="0">
-                <a:effectLst/>
-                <a:latin typeface="Times New Roman" panose="02020603050405020304" pitchFamily="18" charset="0"/>
-                <a:ea typeface="Times New Roman" panose="02020603050405020304" pitchFamily="18" charset="0"/>
-                <a:cs typeface="Times New Roman" panose="02020603050405020304" pitchFamily="18" charset="0"/>
+              <a:rPr lang="ru-RU" dirty="0">
+                <a:solidFill>
+                  <a:srgbClr val="0F496F"/>
+                </a:solidFill>
+                <a:ea typeface="+mn-lt"/>
+                <a:cs typeface="+mn-lt"/>
               </a:rPr>
-              <a:t>	</a:t>
-            </a:r>
-            <a:r>
-              <a:rPr lang="ru-RU" dirty="0">
-                <a:effectLst/>
-                <a:latin typeface="Times New Roman" panose="02020603050405020304" pitchFamily="18" charset="0"/>
-                <a:ea typeface="Times New Roman" panose="02020603050405020304" pitchFamily="18" charset="0"/>
-                <a:cs typeface="Times New Roman" panose="02020603050405020304" pitchFamily="18" charset="0"/>
-              </a:rPr>
-              <a:t>Разработка приложения, включающего в себя веб-</a:t>
-            </a:r>
-            <a:r>
-              <a:rPr lang="ru-RU" dirty="0" err="1">
-                <a:effectLst/>
-                <a:latin typeface="Times New Roman" panose="02020603050405020304" pitchFamily="18" charset="0"/>
-                <a:ea typeface="Times New Roman" panose="02020603050405020304" pitchFamily="18" charset="0"/>
-                <a:cs typeface="Times New Roman" panose="02020603050405020304" pitchFamily="18" charset="0"/>
-              </a:rPr>
-              <a:t>скрапинг</a:t>
-            </a:r>
-            <a:r>
-              <a:rPr lang="ru-RU" dirty="0">
-                <a:effectLst/>
-                <a:latin typeface="Times New Roman" panose="02020603050405020304" pitchFamily="18" charset="0"/>
-                <a:ea typeface="Times New Roman" panose="02020603050405020304" pitchFamily="18" charset="0"/>
-                <a:cs typeface="Times New Roman" panose="02020603050405020304" pitchFamily="18" charset="0"/>
-              </a:rPr>
-              <a:t>, управление базой данных и создание пользовательского интерфейса с использованием фреймворка </a:t>
-            </a:r>
-            <a:r>
-              <a:rPr lang="ru-RU" dirty="0" err="1">
-                <a:effectLst/>
-                <a:latin typeface="Times New Roman" panose="02020603050405020304" pitchFamily="18" charset="0"/>
-                <a:ea typeface="Times New Roman" panose="02020603050405020304" pitchFamily="18" charset="0"/>
-                <a:cs typeface="Times New Roman" panose="02020603050405020304" pitchFamily="18" charset="0"/>
-              </a:rPr>
-              <a:t>System.Windows.Forms</a:t>
-            </a:r>
-            <a:r>
-              <a:rPr lang="ru-RU" dirty="0">
-                <a:effectLst/>
-                <a:latin typeface="Times New Roman" panose="02020603050405020304" pitchFamily="18" charset="0"/>
-                <a:ea typeface="Times New Roman" panose="02020603050405020304" pitchFamily="18" charset="0"/>
-                <a:cs typeface="Times New Roman" panose="02020603050405020304" pitchFamily="18" charset="0"/>
-              </a:rPr>
-              <a:t>, представляет собой многогранный и увлекательный процесс. Взаимодействие с различными компонентами, такими как парсер сайта, база данных и API, требует системного подхода и глубокого понимания каждого элемента системы.</a:t>
-            </a:r>
-          </a:p>
-          <a:p>
-            <a:pPr marL="0" indent="0">
-              <a:lnSpc>
-                <a:spcPct val="150000"/>
-              </a:lnSpc>
-              <a:buNone/>
-            </a:pPr>
-            <a:r>
-              <a:rPr lang="en-US" dirty="0">
-                <a:latin typeface="Times New Roman" panose="02020603050405020304" pitchFamily="18" charset="0"/>
-                <a:cs typeface="Times New Roman" panose="02020603050405020304" pitchFamily="18" charset="0"/>
-              </a:rPr>
-              <a:t>	</a:t>
-            </a:r>
-            <a:r>
-              <a:rPr lang="ru-RU" dirty="0">
-                <a:latin typeface="Times New Roman" panose="02020603050405020304" pitchFamily="18" charset="0"/>
-                <a:cs typeface="Times New Roman" panose="02020603050405020304" pitchFamily="18" charset="0"/>
-              </a:rPr>
-              <a:t>Надеемся, вы бы пользовались таким приложением и нашли бы его полезным и удобным</a:t>
-            </a:r>
+              <a:t>Парсер — программный модуль или инструмент, предназначенный для анализа структуры данных с целью извлечения необходимой информации или выполнения определенных операций. Термин "парсер" часто используется в контексте обработки текстовых данных.</a:t>
+            </a:r>
+            <a:endParaRPr lang="ru-RU" dirty="0"/>
+          </a:p>
+        </p:txBody>
+      </p:sp>
+      <p:pic>
+        <p:nvPicPr>
+          <p:cNvPr id="5" name="Picture 4">
+            <a:extLst>
+              <a:ext uri="{FF2B5EF4-FFF2-40B4-BE49-F238E27FC236}">
+                <a16:creationId xmlns:a16="http://schemas.microsoft.com/office/drawing/2014/main" id="{6547F204-0666-AD9A-4814-97CA021B419B}"/>
+              </a:ext>
+            </a:extLst>
+          </p:cNvPr>
+          <p:cNvPicPr>
+            <a:picLocks noChangeAspect="1"/>
+          </p:cNvPicPr>
+          <p:nvPr/>
+        </p:nvPicPr>
+        <p:blipFill>
+          <a:blip r:embed="rId2">
+            <a:extLst>
+              <a:ext uri="{28A0092B-C50C-407E-A947-70E740481C1C}">
+                <a14:useLocalDpi xmlns:a14="http://schemas.microsoft.com/office/drawing/2010/main" val="0"/>
+              </a:ext>
+            </a:extLst>
+          </a:blip>
+          <a:stretch>
+            <a:fillRect/>
+          </a:stretch>
+        </p:blipFill>
+        <p:spPr>
+          <a:xfrm>
+            <a:off x="8669137" y="2490197"/>
+            <a:ext cx="3293598" cy="2989370"/>
+          </a:xfrm>
+          <a:prstGeom prst="rect">
+            <a:avLst/>
+          </a:prstGeom>
+        </p:spPr>
+      </p:pic>
+    </p:spTree>
+    <p:extLst>
+      <p:ext uri="{BB962C8B-B14F-4D97-AF65-F5344CB8AC3E}">
+        <p14:creationId xmlns:p14="http://schemas.microsoft.com/office/powerpoint/2010/main" val="2557383316"/>
+      </p:ext>
+    </p:extLst>
+  </p:cSld>
+  <p:clrMapOvr>
+    <a:masterClrMapping/>
+  </p:clrMapOvr>
+</p:sld>
+</file>
+
+<file path=ppt/slides/slide8.xml><?xml version="1.0" encoding="utf-8"?>
+<p:sld xmlns:a="http://schemas.openxmlformats.org/drawingml/2006/main" xmlns:r="http://schemas.openxmlformats.org/officeDocument/2006/relationships" xmlns:p="http://schemas.openxmlformats.org/presentationml/2006/main">
+  <p:cSld>
+    <p:spTree>
+      <p:nvGrpSpPr>
+        <p:cNvPr id="1" name="">
+          <a:extLst>
+            <a:ext uri="{FF2B5EF4-FFF2-40B4-BE49-F238E27FC236}">
+              <a16:creationId xmlns:a16="http://schemas.microsoft.com/office/drawing/2014/main" id="{6B33BF4C-B75E-82EC-951D-02354636A20C}"/>
+            </a:ext>
+          </a:extLst>
+        </p:cNvPr>
+        <p:cNvGrpSpPr/>
+        <p:nvPr/>
+      </p:nvGrpSpPr>
+      <p:grpSpPr>
+        <a:xfrm>
+          <a:off x="0" y="0"/>
+          <a:ext cx="0" cy="0"/>
+          <a:chOff x="0" y="0"/>
+          <a:chExt cx="0" cy="0"/>
+        </a:xfrm>
+      </p:grpSpPr>
+      <p:pic>
+        <p:nvPicPr>
+          <p:cNvPr id="4" name="Рисунок 3" descr="Парсинг сайтов конкурентов: 20 самых лучших сервисов">
+            <a:extLst>
+              <a:ext uri="{FF2B5EF4-FFF2-40B4-BE49-F238E27FC236}">
+                <a16:creationId xmlns:a16="http://schemas.microsoft.com/office/drawing/2014/main" id="{E3C719A7-6042-E663-B0FD-C288D9D13796}"/>
+              </a:ext>
+            </a:extLst>
+          </p:cNvPr>
+          <p:cNvPicPr>
+            <a:picLocks noChangeAspect="1"/>
+          </p:cNvPicPr>
+          <p:nvPr/>
+        </p:nvPicPr>
+        <p:blipFill>
+          <a:blip r:embed="rId2"/>
+          <a:stretch>
+            <a:fillRect/>
+          </a:stretch>
+        </p:blipFill>
+        <p:spPr>
+          <a:xfrm>
+            <a:off x="814137" y="778042"/>
+            <a:ext cx="10563725" cy="5301915"/>
+          </a:xfrm>
+          <a:prstGeom prst="rect">
+            <a:avLst/>
+          </a:prstGeom>
+        </p:spPr>
+      </p:pic>
+      <p:sp>
+        <p:nvSpPr>
+          <p:cNvPr id="6" name="Заголовок 5">
+            <a:extLst>
+              <a:ext uri="{FF2B5EF4-FFF2-40B4-BE49-F238E27FC236}">
+                <a16:creationId xmlns:a16="http://schemas.microsoft.com/office/drawing/2014/main" id="{ED82BEF6-AA1C-AF5A-C025-619A726D5E12}"/>
+              </a:ext>
+            </a:extLst>
+          </p:cNvPr>
+          <p:cNvSpPr>
+            <a:spLocks noGrp="1"/>
+          </p:cNvSpPr>
+          <p:nvPr>
+            <p:ph type="title"/>
+          </p:nvPr>
+        </p:nvSpPr>
+        <p:spPr/>
+        <p:txBody>
+          <a:bodyPr/>
+          <a:lstStyle/>
+          <a:p>
+            <a:endParaRPr lang="ru-RU"/>
+          </a:p>
+        </p:txBody>
+      </p:sp>
+      <p:sp>
+        <p:nvSpPr>
+          <p:cNvPr id="8" name="Объект 7">
+            <a:extLst>
+              <a:ext uri="{FF2B5EF4-FFF2-40B4-BE49-F238E27FC236}">
+                <a16:creationId xmlns:a16="http://schemas.microsoft.com/office/drawing/2014/main" id="{F28D0E29-B5AB-5EF1-A00F-55B6C28E66D0}"/>
+              </a:ext>
+            </a:extLst>
+          </p:cNvPr>
+          <p:cNvSpPr>
+            <a:spLocks noGrp="1"/>
+          </p:cNvSpPr>
+          <p:nvPr>
+            <p:ph idx="1"/>
+          </p:nvPr>
+        </p:nvSpPr>
+        <p:spPr/>
+        <p:txBody>
+          <a:bodyPr/>
+          <a:lstStyle/>
+          <a:p>
+            <a:endParaRPr lang="ru-RU"/>
           </a:p>
         </p:txBody>
       </p:sp>
     </p:spTree>
     <p:extLst>
       <p:ext uri="{BB962C8B-B14F-4D97-AF65-F5344CB8AC3E}">
-        <p14:creationId xmlns:p14="http://schemas.microsoft.com/office/powerpoint/2010/main" val="1346782698"/>
+        <p14:creationId xmlns:p14="http://schemas.microsoft.com/office/powerpoint/2010/main" val="1006444665"/>
+      </p:ext>
+    </p:extLst>
+  </p:cSld>
+  <p:clrMapOvr>
+    <a:masterClrMapping/>
+  </p:clrMapOvr>
+</p:sld>
+</file>
+
+<file path=ppt/slides/slide9.xml><?xml version="1.0" encoding="utf-8"?>
+<p:sld xmlns:a="http://schemas.openxmlformats.org/drawingml/2006/main" xmlns:r="http://schemas.openxmlformats.org/officeDocument/2006/relationships" xmlns:p="http://schemas.openxmlformats.org/presentationml/2006/main">
+  <p:cSld>
+    <p:spTree>
+      <p:nvGrpSpPr>
+        <p:cNvPr id="1" name="">
+          <a:extLst>
+            <a:ext uri="{FF2B5EF4-FFF2-40B4-BE49-F238E27FC236}">
+              <a16:creationId xmlns:a16="http://schemas.microsoft.com/office/drawing/2014/main" id="{DBAF7B41-2BCB-7E2C-3580-E333F7668F93}"/>
+            </a:ext>
+          </a:extLst>
+        </p:cNvPr>
+        <p:cNvGrpSpPr/>
+        <p:nvPr/>
+      </p:nvGrpSpPr>
+      <p:grpSpPr>
+        <a:xfrm>
+          <a:off x="0" y="0"/>
+          <a:ext cx="0" cy="0"/>
+          <a:chOff x="0" y="0"/>
+          <a:chExt cx="0" cy="0"/>
+        </a:xfrm>
+      </p:grpSpPr>
+      <p:sp>
+        <p:nvSpPr>
+          <p:cNvPr id="2" name="Title 1">
+            <a:extLst>
+              <a:ext uri="{FF2B5EF4-FFF2-40B4-BE49-F238E27FC236}">
+                <a16:creationId xmlns:a16="http://schemas.microsoft.com/office/drawing/2014/main" id="{0591389A-D484-DC1C-5E36-941FBA623C8A}"/>
+              </a:ext>
+            </a:extLst>
+          </p:cNvPr>
+          <p:cNvSpPr>
+            <a:spLocks noGrp="1"/>
+          </p:cNvSpPr>
+          <p:nvPr>
+            <p:ph type="title"/>
+          </p:nvPr>
+        </p:nvSpPr>
+        <p:spPr/>
+        <p:txBody>
+          <a:bodyPr/>
+          <a:lstStyle/>
+          <a:p>
+            <a:r>
+              <a:rPr lang="en-US" dirty="0">
+                <a:ea typeface="+mj-lt"/>
+                <a:cs typeface="+mj-lt"/>
+              </a:rPr>
+              <a:t>HTML Agility Pack (HAP)</a:t>
+            </a:r>
+            <a:endParaRPr lang="ru-RU" dirty="0"/>
+          </a:p>
+        </p:txBody>
+      </p:sp>
+      <p:sp>
+        <p:nvSpPr>
+          <p:cNvPr id="3" name="Content Placeholder 2">
+            <a:extLst>
+              <a:ext uri="{FF2B5EF4-FFF2-40B4-BE49-F238E27FC236}">
+                <a16:creationId xmlns:a16="http://schemas.microsoft.com/office/drawing/2014/main" id="{DCCBB7B5-E751-A566-C3B1-B05BC3155761}"/>
+              </a:ext>
+            </a:extLst>
+          </p:cNvPr>
+          <p:cNvSpPr>
+            <a:spLocks noGrp="1"/>
+          </p:cNvSpPr>
+          <p:nvPr>
+            <p:ph idx="1"/>
+          </p:nvPr>
+        </p:nvSpPr>
+        <p:spPr>
+          <a:xfrm>
+            <a:off x="6452970" y="958401"/>
+            <a:ext cx="5197072" cy="5707424"/>
+          </a:xfrm>
+        </p:spPr>
+        <p:txBody>
+          <a:bodyPr>
+            <a:normAutofit lnSpcReduction="10000"/>
+          </a:bodyPr>
+          <a:lstStyle/>
+          <a:p>
+            <a:pPr lvl="1">
+              <a:buNone/>
+            </a:pPr>
+            <a:r>
+              <a:rPr lang="ru-RU" dirty="0">
+                <a:ea typeface="+mn-lt"/>
+                <a:cs typeface="+mn-lt"/>
+              </a:rPr>
+              <a:t>HTML </a:t>
+            </a:r>
+            <a:r>
+              <a:rPr lang="ru-RU" dirty="0" err="1">
+                <a:ea typeface="+mn-lt"/>
+                <a:cs typeface="+mn-lt"/>
+              </a:rPr>
+              <a:t>Agility</a:t>
+            </a:r>
+            <a:r>
+              <a:rPr lang="ru-RU" dirty="0">
+                <a:ea typeface="+mn-lt"/>
+                <a:cs typeface="+mn-lt"/>
+              </a:rPr>
+              <a:t> Pack библиотека для языка программирования C#, предназначенная для анализа и обработки HTML-документов. Она предоставляет удобные инструменты для навигации, выборки и модификации элементов HTML, а также извлечения данных из веб-страниц. </a:t>
+            </a:r>
+            <a:endParaRPr lang="ru-RU"/>
+          </a:p>
+          <a:p>
+            <a:pPr lvl="1">
+              <a:buNone/>
+            </a:pPr>
+            <a:endParaRPr lang="ru-RU"/>
+          </a:p>
+          <a:p>
+            <a:pPr lvl="1">
+              <a:buNone/>
+            </a:pPr>
+            <a:r>
+              <a:rPr lang="ru-RU" dirty="0">
+                <a:ea typeface="+mn-lt"/>
+                <a:cs typeface="+mn-lt"/>
+              </a:rPr>
+              <a:t>HTML </a:t>
+            </a:r>
+            <a:r>
+              <a:rPr lang="ru-RU" dirty="0" err="1">
+                <a:ea typeface="+mn-lt"/>
+                <a:cs typeface="+mn-lt"/>
+              </a:rPr>
+              <a:t>Agility</a:t>
+            </a:r>
+            <a:r>
+              <a:rPr lang="ru-RU" dirty="0">
+                <a:ea typeface="+mn-lt"/>
+                <a:cs typeface="+mn-lt"/>
+              </a:rPr>
+              <a:t> Pack обеспечивает объектную модель для представления HTML-документа, позволяя вам проводить различные операции с его содержимым. Эта библиотека особенно полезна в сценариях, связанных с веб-</a:t>
+            </a:r>
+            <a:r>
+              <a:rPr lang="ru-RU" dirty="0" err="1">
+                <a:ea typeface="+mn-lt"/>
+                <a:cs typeface="+mn-lt"/>
+              </a:rPr>
+              <a:t>скрапингом</a:t>
+            </a:r>
+            <a:r>
+              <a:rPr lang="ru-RU" dirty="0">
+                <a:ea typeface="+mn-lt"/>
+                <a:cs typeface="+mn-lt"/>
+              </a:rPr>
+              <a:t> (извлечение данных из веб-страниц) или обработкой HTML-контента в рамках C#-приложений. </a:t>
+            </a:r>
+          </a:p>
+          <a:p>
+            <a:pPr lvl="1">
+              <a:buNone/>
+            </a:pPr>
+            <a:endParaRPr lang="ru-RU"/>
+          </a:p>
+          <a:p>
+            <a:pPr lvl="1">
+              <a:buNone/>
+            </a:pPr>
+            <a:endParaRPr lang="ru-RU"/>
+          </a:p>
+          <a:p>
+            <a:pPr marL="457200" lvl="1" indent="0">
+              <a:buNone/>
+            </a:pPr>
+            <a:endParaRPr lang="ru-RU"/>
+          </a:p>
+        </p:txBody>
+      </p:sp>
+      <p:pic>
+        <p:nvPicPr>
+          <p:cNvPr id="4" name="Рисунок 3" descr="Cómo parsear HTML en C# con HTML Agility Pack">
+            <a:extLst>
+              <a:ext uri="{FF2B5EF4-FFF2-40B4-BE49-F238E27FC236}">
+                <a16:creationId xmlns:a16="http://schemas.microsoft.com/office/drawing/2014/main" id="{DEBC19C9-724A-C257-BC9C-6F93453AB147}"/>
+              </a:ext>
+            </a:extLst>
+          </p:cNvPr>
+          <p:cNvPicPr>
+            <a:picLocks noChangeAspect="1"/>
+          </p:cNvPicPr>
+          <p:nvPr/>
+        </p:nvPicPr>
+        <p:blipFill>
+          <a:blip r:embed="rId2"/>
+          <a:stretch>
+            <a:fillRect/>
+          </a:stretch>
+        </p:blipFill>
+        <p:spPr>
+          <a:xfrm>
+            <a:off x="1308769" y="1480834"/>
+            <a:ext cx="4374147" cy="2907070"/>
+          </a:xfrm>
+          <a:prstGeom prst="rect">
+            <a:avLst/>
+          </a:prstGeom>
+        </p:spPr>
+      </p:pic>
+    </p:spTree>
+    <p:extLst>
+      <p:ext uri="{BB962C8B-B14F-4D97-AF65-F5344CB8AC3E}">
+        <p14:creationId xmlns:p14="http://schemas.microsoft.com/office/powerpoint/2010/main" val="3129265044"/>
       </p:ext>
     </p:extLst>
   </p:cSld>

</xml_diff>